<commit_message>
Pushing my version of code before switching to do Diana's piece
</commit_message>
<xml_diff>
--- a/Data/DUCC_Figs.pptx
+++ b/Data/DUCC_Figs.pptx
@@ -8,6 +8,7 @@
     <p:sldId id="256" r:id="rId2"/>
     <p:sldId id="257" r:id="rId3"/>
     <p:sldId id="258" r:id="rId4"/>
+    <p:sldId id="259" r:id="rId5"/>
   </p:sldIdLst>
   <p:sldSz cx="12192000" cy="6858000"/>
   <p:notesSz cx="6858000" cy="9144000"/>
@@ -261,7 +262,7 @@
           <a:p>
             <a:fld id="{115498C7-2E61-824C-864D-A2A19585B4B1}" type="datetimeFigureOut">
               <a:rPr lang="en-US" smtClean="0"/>
-              <a:t>3/10/20</a:t>
+              <a:t>4/15/20</a:t>
             </a:fld>
             <a:endParaRPr lang="en-US"/>
           </a:p>
@@ -459,7 +460,7 @@
           <a:p>
             <a:fld id="{115498C7-2E61-824C-864D-A2A19585B4B1}" type="datetimeFigureOut">
               <a:rPr lang="en-US" smtClean="0"/>
-              <a:t>3/10/20</a:t>
+              <a:t>4/15/20</a:t>
             </a:fld>
             <a:endParaRPr lang="en-US"/>
           </a:p>
@@ -667,7 +668,7 @@
           <a:p>
             <a:fld id="{115498C7-2E61-824C-864D-A2A19585B4B1}" type="datetimeFigureOut">
               <a:rPr lang="en-US" smtClean="0"/>
-              <a:t>3/10/20</a:t>
+              <a:t>4/15/20</a:t>
             </a:fld>
             <a:endParaRPr lang="en-US"/>
           </a:p>
@@ -865,7 +866,7 @@
           <a:p>
             <a:fld id="{115498C7-2E61-824C-864D-A2A19585B4B1}" type="datetimeFigureOut">
               <a:rPr lang="en-US" smtClean="0"/>
-              <a:t>3/10/20</a:t>
+              <a:t>4/15/20</a:t>
             </a:fld>
             <a:endParaRPr lang="en-US"/>
           </a:p>
@@ -1140,7 +1141,7 @@
           <a:p>
             <a:fld id="{115498C7-2E61-824C-864D-A2A19585B4B1}" type="datetimeFigureOut">
               <a:rPr lang="en-US" smtClean="0"/>
-              <a:t>3/10/20</a:t>
+              <a:t>4/15/20</a:t>
             </a:fld>
             <a:endParaRPr lang="en-US"/>
           </a:p>
@@ -1405,7 +1406,7 @@
           <a:p>
             <a:fld id="{115498C7-2E61-824C-864D-A2A19585B4B1}" type="datetimeFigureOut">
               <a:rPr lang="en-US" smtClean="0"/>
-              <a:t>3/10/20</a:t>
+              <a:t>4/15/20</a:t>
             </a:fld>
             <a:endParaRPr lang="en-US"/>
           </a:p>
@@ -1817,7 +1818,7 @@
           <a:p>
             <a:fld id="{115498C7-2E61-824C-864D-A2A19585B4B1}" type="datetimeFigureOut">
               <a:rPr lang="en-US" smtClean="0"/>
-              <a:t>3/10/20</a:t>
+              <a:t>4/15/20</a:t>
             </a:fld>
             <a:endParaRPr lang="en-US"/>
           </a:p>
@@ -1958,7 +1959,7 @@
           <a:p>
             <a:fld id="{115498C7-2E61-824C-864D-A2A19585B4B1}" type="datetimeFigureOut">
               <a:rPr lang="en-US" smtClean="0"/>
-              <a:t>3/10/20</a:t>
+              <a:t>4/15/20</a:t>
             </a:fld>
             <a:endParaRPr lang="en-US"/>
           </a:p>
@@ -2071,7 +2072,7 @@
           <a:p>
             <a:fld id="{115498C7-2E61-824C-864D-A2A19585B4B1}" type="datetimeFigureOut">
               <a:rPr lang="en-US" smtClean="0"/>
-              <a:t>3/10/20</a:t>
+              <a:t>4/15/20</a:t>
             </a:fld>
             <a:endParaRPr lang="en-US"/>
           </a:p>
@@ -2382,7 +2383,7 @@
           <a:p>
             <a:fld id="{115498C7-2E61-824C-864D-A2A19585B4B1}" type="datetimeFigureOut">
               <a:rPr lang="en-US" smtClean="0"/>
-              <a:t>3/10/20</a:t>
+              <a:t>4/15/20</a:t>
             </a:fld>
             <a:endParaRPr lang="en-US"/>
           </a:p>
@@ -2670,7 +2671,7 @@
           <a:p>
             <a:fld id="{115498C7-2E61-824C-864D-A2A19585B4B1}" type="datetimeFigureOut">
               <a:rPr lang="en-US" smtClean="0"/>
-              <a:t>3/10/20</a:t>
+              <a:t>4/15/20</a:t>
             </a:fld>
             <a:endParaRPr lang="en-US"/>
           </a:p>
@@ -2911,7 +2912,7 @@
           <a:p>
             <a:fld id="{115498C7-2E61-824C-864D-A2A19585B4B1}" type="datetimeFigureOut">
               <a:rPr lang="en-US" smtClean="0"/>
-              <a:t>3/10/20</a:t>
+              <a:t>4/15/20</a:t>
             </a:fld>
             <a:endParaRPr lang="en-US"/>
           </a:p>
@@ -6870,6 +6871,676 @@
 </p:sld>
 </file>
 
+<file path=ppt/slides/slide4.xml><?xml version="1.0" encoding="utf-8"?>
+<p:sld xmlns:a="http://schemas.openxmlformats.org/drawingml/2006/main" xmlns:r="http://schemas.openxmlformats.org/officeDocument/2006/relationships" xmlns:p="http://schemas.openxmlformats.org/presentationml/2006/main">
+  <p:cSld>
+    <p:spTree>
+      <p:nvGrpSpPr>
+        <p:cNvPr id="1" name=""/>
+        <p:cNvGrpSpPr/>
+        <p:nvPr/>
+      </p:nvGrpSpPr>
+      <p:grpSpPr>
+        <a:xfrm>
+          <a:off x="0" y="0"/>
+          <a:ext cx="0" cy="0"/>
+          <a:chOff x="0" y="0"/>
+          <a:chExt cx="0" cy="0"/>
+        </a:xfrm>
+      </p:grpSpPr>
+      <p:grpSp>
+        <p:nvGrpSpPr>
+          <p:cNvPr id="11" name="Group 10">
+            <a:extLst>
+              <a:ext uri="{FF2B5EF4-FFF2-40B4-BE49-F238E27FC236}">
+                <a16:creationId xmlns:a16="http://schemas.microsoft.com/office/drawing/2014/main" id="{18A85937-B4A3-C14E-BF48-1C27E2CA3276}"/>
+              </a:ext>
+            </a:extLst>
+          </p:cNvPr>
+          <p:cNvGrpSpPr/>
+          <p:nvPr/>
+        </p:nvGrpSpPr>
+        <p:grpSpPr>
+          <a:xfrm>
+            <a:off x="7271615" y="1688897"/>
+            <a:ext cx="3576530" cy="3803501"/>
+            <a:chOff x="7271615" y="1688897"/>
+            <a:chExt cx="3576530" cy="3803501"/>
+          </a:xfrm>
+        </p:grpSpPr>
+        <p:sp>
+          <p:nvSpPr>
+            <p:cNvPr id="44" name="Right Arrow 43">
+              <a:extLst>
+                <a:ext uri="{FF2B5EF4-FFF2-40B4-BE49-F238E27FC236}">
+                  <a16:creationId xmlns:a16="http://schemas.microsoft.com/office/drawing/2014/main" id="{B6944315-8660-B344-9D29-0A757EA9C6ED}"/>
+                </a:ext>
+              </a:extLst>
+            </p:cNvPr>
+            <p:cNvSpPr/>
+            <p:nvPr/>
+          </p:nvSpPr>
+          <p:spPr>
+            <a:xfrm>
+              <a:off x="7271615" y="3787404"/>
+              <a:ext cx="853305" cy="689699"/>
+            </a:xfrm>
+            <a:prstGeom prst="rightArrow">
+              <a:avLst/>
+            </a:prstGeom>
+            <a:solidFill>
+              <a:schemeClr val="accent5">
+                <a:lumMod val="40000"/>
+                <a:lumOff val="60000"/>
+              </a:schemeClr>
+            </a:solidFill>
+            <a:ln>
+              <a:noFill/>
+            </a:ln>
+          </p:spPr>
+          <p:style>
+            <a:lnRef idx="2">
+              <a:schemeClr val="accent1">
+                <a:shade val="50000"/>
+              </a:schemeClr>
+            </a:lnRef>
+            <a:fillRef idx="1">
+              <a:schemeClr val="accent1"/>
+            </a:fillRef>
+            <a:effectRef idx="0">
+              <a:schemeClr val="accent1"/>
+            </a:effectRef>
+            <a:fontRef idx="minor">
+              <a:schemeClr val="lt1"/>
+            </a:fontRef>
+          </p:style>
+          <p:txBody>
+            <a:bodyPr rtlCol="0" anchor="ctr"/>
+            <a:lstStyle/>
+            <a:p>
+              <a:pPr algn="ctr"/>
+              <a:endParaRPr lang="en-US"/>
+            </a:p>
+          </p:txBody>
+        </p:sp>
+        <p:grpSp>
+          <p:nvGrpSpPr>
+            <p:cNvPr id="69" name="Group 68">
+              <a:extLst>
+                <a:ext uri="{FF2B5EF4-FFF2-40B4-BE49-F238E27FC236}">
+                  <a16:creationId xmlns:a16="http://schemas.microsoft.com/office/drawing/2014/main" id="{E6B10F4B-5D8B-BF47-8A08-343C7B7126F4}"/>
+                </a:ext>
+              </a:extLst>
+            </p:cNvPr>
+            <p:cNvGrpSpPr/>
+            <p:nvPr/>
+          </p:nvGrpSpPr>
+          <p:grpSpPr>
+            <a:xfrm>
+              <a:off x="8186705" y="1688897"/>
+              <a:ext cx="2661440" cy="3803501"/>
+              <a:chOff x="8736191" y="1651827"/>
+              <a:chExt cx="2661440" cy="3803501"/>
+            </a:xfrm>
+          </p:grpSpPr>
+          <p:sp>
+            <p:nvSpPr>
+              <p:cNvPr id="47" name="Rounded Rectangle 46">
+                <a:extLst>
+                  <a:ext uri="{FF2B5EF4-FFF2-40B4-BE49-F238E27FC236}">
+                    <a16:creationId xmlns:a16="http://schemas.microsoft.com/office/drawing/2014/main" id="{0F761519-8340-B34F-88A6-B375C3025ED5}"/>
+                  </a:ext>
+                </a:extLst>
+              </p:cNvPr>
+              <p:cNvSpPr/>
+              <p:nvPr/>
+            </p:nvSpPr>
+            <p:spPr>
+              <a:xfrm>
+                <a:off x="8844192" y="3374763"/>
+                <a:ext cx="2171685" cy="1295209"/>
+              </a:xfrm>
+              <a:prstGeom prst="roundRect">
+                <a:avLst/>
+              </a:prstGeom>
+              <a:solidFill>
+                <a:srgbClr val="FF77A0">
+                  <a:alpha val="25098"/>
+                </a:srgbClr>
+              </a:solidFill>
+              <a:ln>
+                <a:noFill/>
+              </a:ln>
+              <a:scene3d>
+                <a:camera prst="orthographicFront"/>
+                <a:lightRig rig="threePt" dir="t"/>
+              </a:scene3d>
+              <a:sp3d>
+                <a:bevelT w="38100" h="38100"/>
+              </a:sp3d>
+            </p:spPr>
+            <p:style>
+              <a:lnRef idx="2">
+                <a:schemeClr val="accent1">
+                  <a:shade val="50000"/>
+                </a:schemeClr>
+              </a:lnRef>
+              <a:fillRef idx="1">
+                <a:schemeClr val="accent1"/>
+              </a:fillRef>
+              <a:effectRef idx="0">
+                <a:schemeClr val="accent1"/>
+              </a:effectRef>
+              <a:fontRef idx="minor">
+                <a:schemeClr val="lt1"/>
+              </a:fontRef>
+            </p:style>
+            <p:txBody>
+              <a:bodyPr rtlCol="0" anchor="ctr"/>
+              <a:lstStyle/>
+              <a:p>
+                <a:pPr algn="ctr"/>
+                <a:endParaRPr lang="en-US" dirty="0"/>
+              </a:p>
+            </p:txBody>
+          </p:sp>
+          <p:sp>
+            <p:nvSpPr>
+              <p:cNvPr id="52" name="Rounded Rectangle 51">
+                <a:extLst>
+                  <a:ext uri="{FF2B5EF4-FFF2-40B4-BE49-F238E27FC236}">
+                    <a16:creationId xmlns:a16="http://schemas.microsoft.com/office/drawing/2014/main" id="{EB060B0E-0474-9944-A9F6-5541B37542AF}"/>
+                  </a:ext>
+                </a:extLst>
+              </p:cNvPr>
+              <p:cNvSpPr/>
+              <p:nvPr/>
+            </p:nvSpPr>
+            <p:spPr>
+              <a:xfrm>
+                <a:off x="8736191" y="1651827"/>
+                <a:ext cx="2222500" cy="891398"/>
+              </a:xfrm>
+              <a:prstGeom prst="roundRect">
+                <a:avLst/>
+              </a:prstGeom>
+              <a:solidFill>
+                <a:srgbClr val="FF77A0">
+                  <a:alpha val="25098"/>
+                </a:srgbClr>
+              </a:solidFill>
+              <a:ln>
+                <a:noFill/>
+              </a:ln>
+              <a:scene3d>
+                <a:camera prst="orthographicFront"/>
+                <a:lightRig rig="threePt" dir="t"/>
+              </a:scene3d>
+              <a:sp3d>
+                <a:bevelT w="38100" h="38100"/>
+              </a:sp3d>
+            </p:spPr>
+            <p:style>
+              <a:lnRef idx="2">
+                <a:schemeClr val="accent1">
+                  <a:shade val="50000"/>
+                </a:schemeClr>
+              </a:lnRef>
+              <a:fillRef idx="1">
+                <a:schemeClr val="accent1"/>
+              </a:fillRef>
+              <a:effectRef idx="0">
+                <a:schemeClr val="accent1"/>
+              </a:effectRef>
+              <a:fontRef idx="minor">
+                <a:schemeClr val="lt1"/>
+              </a:fontRef>
+            </p:style>
+            <p:txBody>
+              <a:bodyPr rtlCol="0" anchor="ctr"/>
+              <a:lstStyle/>
+              <a:p>
+                <a:pPr algn="ctr"/>
+                <a:endParaRPr lang="en-US"/>
+              </a:p>
+            </p:txBody>
+          </p:sp>
+          <p:cxnSp>
+            <p:nvCxnSpPr>
+              <p:cNvPr id="59" name="Straight Connector 58">
+                <a:extLst>
+                  <a:ext uri="{FF2B5EF4-FFF2-40B4-BE49-F238E27FC236}">
+                    <a16:creationId xmlns:a16="http://schemas.microsoft.com/office/drawing/2014/main" id="{8E24C97A-A41D-DD4B-9B7F-ABD6651F8E01}"/>
+                  </a:ext>
+                </a:extLst>
+              </p:cNvPr>
+              <p:cNvCxnSpPr>
+                <a:cxnSpLocks/>
+                <a:endCxn id="47" idx="3"/>
+              </p:cNvCxnSpPr>
+              <p:nvPr/>
+            </p:nvCxnSpPr>
+            <p:spPr>
+              <a:xfrm flipH="1">
+                <a:off x="11015877" y="4022368"/>
+                <a:ext cx="381754" cy="0"/>
+              </a:xfrm>
+              <a:prstGeom prst="line">
+                <a:avLst/>
+              </a:prstGeom>
+              <a:ln w="38100">
+                <a:solidFill>
+                  <a:srgbClr val="BDD8EF"/>
+                </a:solidFill>
+                <a:headEnd type="triangle"/>
+                <a:tailEnd type="none"/>
+              </a:ln>
+            </p:spPr>
+            <p:style>
+              <a:lnRef idx="1">
+                <a:schemeClr val="accent1"/>
+              </a:lnRef>
+              <a:fillRef idx="0">
+                <a:schemeClr val="accent1"/>
+              </a:fillRef>
+              <a:effectRef idx="0">
+                <a:schemeClr val="accent1"/>
+              </a:effectRef>
+              <a:fontRef idx="minor">
+                <a:schemeClr val="tx1"/>
+              </a:fontRef>
+            </p:style>
+          </p:cxnSp>
+          <p:cxnSp>
+            <p:nvCxnSpPr>
+              <p:cNvPr id="58" name="Straight Connector 57">
+                <a:extLst>
+                  <a:ext uri="{FF2B5EF4-FFF2-40B4-BE49-F238E27FC236}">
+                    <a16:creationId xmlns:a16="http://schemas.microsoft.com/office/drawing/2014/main" id="{3F6C9313-400E-6E44-A0CB-3CE03D7E710A}"/>
+                  </a:ext>
+                </a:extLst>
+              </p:cNvPr>
+              <p:cNvCxnSpPr>
+                <a:cxnSpLocks/>
+              </p:cNvCxnSpPr>
+              <p:nvPr/>
+            </p:nvCxnSpPr>
+            <p:spPr>
+              <a:xfrm>
+                <a:off x="11363379" y="2163627"/>
+                <a:ext cx="9537" cy="1865376"/>
+              </a:xfrm>
+              <a:prstGeom prst="line">
+                <a:avLst/>
+              </a:prstGeom>
+              <a:ln w="38100">
+                <a:solidFill>
+                  <a:srgbClr val="BDD8EF"/>
+                </a:solidFill>
+              </a:ln>
+            </p:spPr>
+            <p:style>
+              <a:lnRef idx="1">
+                <a:schemeClr val="accent1"/>
+              </a:lnRef>
+              <a:fillRef idx="0">
+                <a:schemeClr val="accent1"/>
+              </a:fillRef>
+              <a:effectRef idx="0">
+                <a:schemeClr val="accent1"/>
+              </a:effectRef>
+              <a:fontRef idx="minor">
+                <a:schemeClr val="tx1"/>
+              </a:fontRef>
+            </p:style>
+          </p:cxnSp>
+          <p:cxnSp>
+            <p:nvCxnSpPr>
+              <p:cNvPr id="63" name="Straight Connector 62">
+                <a:extLst>
+                  <a:ext uri="{FF2B5EF4-FFF2-40B4-BE49-F238E27FC236}">
+                    <a16:creationId xmlns:a16="http://schemas.microsoft.com/office/drawing/2014/main" id="{F9CE5EE0-29DA-CA46-B3B4-77328A196EB3}"/>
+                  </a:ext>
+                </a:extLst>
+              </p:cNvPr>
+              <p:cNvCxnSpPr>
+                <a:cxnSpLocks/>
+              </p:cNvCxnSpPr>
+              <p:nvPr/>
+            </p:nvCxnSpPr>
+            <p:spPr>
+              <a:xfrm flipH="1">
+                <a:off x="10943149" y="2175984"/>
+                <a:ext cx="432588" cy="0"/>
+              </a:xfrm>
+              <a:prstGeom prst="line">
+                <a:avLst/>
+              </a:prstGeom>
+              <a:ln w="38100">
+                <a:solidFill>
+                  <a:srgbClr val="BDD8EF"/>
+                </a:solidFill>
+                <a:headEnd type="none"/>
+                <a:tailEnd type="triangle"/>
+              </a:ln>
+            </p:spPr>
+            <p:style>
+              <a:lnRef idx="1">
+                <a:schemeClr val="accent1"/>
+              </a:lnRef>
+              <a:fillRef idx="0">
+                <a:schemeClr val="accent1"/>
+              </a:fillRef>
+              <a:effectRef idx="0">
+                <a:schemeClr val="accent1"/>
+              </a:effectRef>
+              <a:fontRef idx="minor">
+                <a:schemeClr val="tx1"/>
+              </a:fontRef>
+            </p:style>
+          </p:cxnSp>
+          <p:cxnSp>
+            <p:nvCxnSpPr>
+              <p:cNvPr id="64" name="Straight Connector 63">
+                <a:extLst>
+                  <a:ext uri="{FF2B5EF4-FFF2-40B4-BE49-F238E27FC236}">
+                    <a16:creationId xmlns:a16="http://schemas.microsoft.com/office/drawing/2014/main" id="{2E922EC1-25A7-EB41-A077-ACD1A7EB9012}"/>
+                  </a:ext>
+                </a:extLst>
+              </p:cNvPr>
+              <p:cNvCxnSpPr>
+                <a:cxnSpLocks/>
+              </p:cNvCxnSpPr>
+              <p:nvPr/>
+            </p:nvCxnSpPr>
+            <p:spPr>
+              <a:xfrm>
+                <a:off x="9831014" y="2890073"/>
+                <a:ext cx="0" cy="467489"/>
+              </a:xfrm>
+              <a:prstGeom prst="line">
+                <a:avLst/>
+              </a:prstGeom>
+              <a:ln w="38100">
+                <a:solidFill>
+                  <a:srgbClr val="BDD8EF"/>
+                </a:solidFill>
+                <a:headEnd type="none"/>
+                <a:tailEnd type="triangle"/>
+              </a:ln>
+            </p:spPr>
+            <p:style>
+              <a:lnRef idx="1">
+                <a:schemeClr val="accent1"/>
+              </a:lnRef>
+              <a:fillRef idx="0">
+                <a:schemeClr val="accent1"/>
+              </a:fillRef>
+              <a:effectRef idx="0">
+                <a:schemeClr val="accent1"/>
+              </a:effectRef>
+              <a:fontRef idx="minor">
+                <a:schemeClr val="tx1"/>
+              </a:fontRef>
+            </p:style>
+          </p:cxnSp>
+          <p:sp>
+            <p:nvSpPr>
+              <p:cNvPr id="66" name="Right Arrow 65">
+                <a:extLst>
+                  <a:ext uri="{FF2B5EF4-FFF2-40B4-BE49-F238E27FC236}">
+                    <a16:creationId xmlns:a16="http://schemas.microsoft.com/office/drawing/2014/main" id="{1992C89A-731C-3147-8E02-68198688BCDF}"/>
+                  </a:ext>
+                </a:extLst>
+              </p:cNvPr>
+              <p:cNvSpPr/>
+              <p:nvPr/>
+            </p:nvSpPr>
+            <p:spPr>
+              <a:xfrm rot="5400000">
+                <a:off x="9668094" y="4757454"/>
+                <a:ext cx="704859" cy="690889"/>
+              </a:xfrm>
+              <a:prstGeom prst="rightArrow">
+                <a:avLst/>
+              </a:prstGeom>
+              <a:solidFill>
+                <a:schemeClr val="accent5">
+                  <a:lumMod val="40000"/>
+                  <a:lumOff val="60000"/>
+                </a:schemeClr>
+              </a:solidFill>
+              <a:ln>
+                <a:noFill/>
+              </a:ln>
+            </p:spPr>
+            <p:style>
+              <a:lnRef idx="2">
+                <a:schemeClr val="accent1">
+                  <a:shade val="50000"/>
+                </a:schemeClr>
+              </a:lnRef>
+              <a:fillRef idx="1">
+                <a:schemeClr val="accent1"/>
+              </a:fillRef>
+              <a:effectRef idx="0">
+                <a:schemeClr val="accent1"/>
+              </a:effectRef>
+              <a:fontRef idx="minor">
+                <a:schemeClr val="lt1"/>
+              </a:fontRef>
+            </p:style>
+            <p:txBody>
+              <a:bodyPr rtlCol="0" anchor="ctr"/>
+              <a:lstStyle/>
+              <a:p>
+                <a:pPr algn="ctr"/>
+                <a:endParaRPr lang="en-US"/>
+              </a:p>
+            </p:txBody>
+          </p:sp>
+        </p:grpSp>
+        <p:pic>
+          <p:nvPicPr>
+            <p:cNvPr id="71" name="Picture 70">
+              <a:extLst>
+                <a:ext uri="{FF2B5EF4-FFF2-40B4-BE49-F238E27FC236}">
+                  <a16:creationId xmlns:a16="http://schemas.microsoft.com/office/drawing/2014/main" id="{7F616460-FFC0-FC4F-8A81-293E5EAC5D0D}"/>
+                </a:ext>
+              </a:extLst>
+            </p:cNvPr>
+            <p:cNvPicPr>
+              <a:picLocks noChangeAspect="1"/>
+            </p:cNvPicPr>
+            <p:nvPr/>
+          </p:nvPicPr>
+          <p:blipFill>
+            <a:blip r:embed="rId2"/>
+            <a:stretch>
+              <a:fillRect/>
+            </a:stretch>
+          </p:blipFill>
+          <p:spPr>
+            <a:xfrm>
+              <a:off x="8754255" y="4189518"/>
+              <a:ext cx="1062227" cy="297745"/>
+            </a:xfrm>
+            <a:prstGeom prst="rect">
+              <a:avLst/>
+            </a:prstGeom>
+          </p:spPr>
+        </p:pic>
+        <p:sp>
+          <p:nvSpPr>
+            <p:cNvPr id="72" name="TextBox 71">
+              <a:extLst>
+                <a:ext uri="{FF2B5EF4-FFF2-40B4-BE49-F238E27FC236}">
+                  <a16:creationId xmlns:a16="http://schemas.microsoft.com/office/drawing/2014/main" id="{ABDC6F39-17C2-AA46-A4D3-F8244B2DAA94}"/>
+                </a:ext>
+              </a:extLst>
+            </p:cNvPr>
+            <p:cNvSpPr txBox="1"/>
+            <p:nvPr/>
+          </p:nvSpPr>
+          <p:spPr>
+            <a:xfrm>
+              <a:off x="8126959" y="3485923"/>
+              <a:ext cx="2495114" cy="646331"/>
+            </a:xfrm>
+            <a:prstGeom prst="rect">
+              <a:avLst/>
+            </a:prstGeom>
+            <a:noFill/>
+          </p:spPr>
+          <p:txBody>
+            <a:bodyPr wrap="square" rtlCol="0">
+              <a:spAutoFit/>
+            </a:bodyPr>
+            <a:lstStyle/>
+            <a:p>
+              <a:pPr algn="ctr"/>
+              <a:r>
+                <a:rPr lang="en-US" dirty="0">
+                  <a:latin typeface="Times New Roman" panose="02020603050405020304" pitchFamily="18" charset="0"/>
+                  <a:cs typeface="Times New Roman" panose="02020603050405020304" pitchFamily="18" charset="0"/>
+                </a:rPr>
+                <a:t>Prepare Parameterized</a:t>
+              </a:r>
+            </a:p>
+            <a:p>
+              <a:pPr algn="ctr"/>
+              <a:r>
+                <a:rPr lang="en-US" dirty="0">
+                  <a:latin typeface="Times New Roman" panose="02020603050405020304" pitchFamily="18" charset="0"/>
+                  <a:cs typeface="Times New Roman" panose="02020603050405020304" pitchFamily="18" charset="0"/>
+                </a:rPr>
+                <a:t>Wavefunction</a:t>
+              </a:r>
+            </a:p>
+          </p:txBody>
+        </p:sp>
+        <p:sp>
+          <p:nvSpPr>
+            <p:cNvPr id="74" name="TextBox 73">
+              <a:extLst>
+                <a:ext uri="{FF2B5EF4-FFF2-40B4-BE49-F238E27FC236}">
+                  <a16:creationId xmlns:a16="http://schemas.microsoft.com/office/drawing/2014/main" id="{41E98EE3-7540-F34C-887E-D522AF47A190}"/>
+                </a:ext>
+              </a:extLst>
+            </p:cNvPr>
+            <p:cNvSpPr txBox="1"/>
+            <p:nvPr/>
+          </p:nvSpPr>
+          <p:spPr>
+            <a:xfrm>
+              <a:off x="8256344" y="2557357"/>
+              <a:ext cx="2086637" cy="369332"/>
+            </a:xfrm>
+            <a:prstGeom prst="rect">
+              <a:avLst/>
+            </a:prstGeom>
+            <a:noFill/>
+          </p:spPr>
+          <p:txBody>
+            <a:bodyPr wrap="square" rtlCol="0">
+              <a:spAutoFit/>
+            </a:bodyPr>
+            <a:lstStyle/>
+            <a:p>
+              <a:pPr algn="ctr"/>
+              <a:r>
+                <a:rPr lang="en-US" dirty="0">
+                  <a:latin typeface="Times New Roman" panose="02020603050405020304" pitchFamily="18" charset="0"/>
+                  <a:cs typeface="Times New Roman" panose="02020603050405020304" pitchFamily="18" charset="0"/>
+                </a:rPr>
+                <a:t>Updated Parameters</a:t>
+              </a:r>
+            </a:p>
+          </p:txBody>
+        </p:sp>
+        <p:sp>
+          <p:nvSpPr>
+            <p:cNvPr id="76" name="TextBox 75">
+              <a:extLst>
+                <a:ext uri="{FF2B5EF4-FFF2-40B4-BE49-F238E27FC236}">
+                  <a16:creationId xmlns:a16="http://schemas.microsoft.com/office/drawing/2014/main" id="{58725293-4A4D-9F44-B785-195EA18DA03E}"/>
+                </a:ext>
+              </a:extLst>
+            </p:cNvPr>
+            <p:cNvSpPr txBox="1"/>
+            <p:nvPr/>
+          </p:nvSpPr>
+          <p:spPr>
+            <a:xfrm>
+              <a:off x="8127874" y="1744989"/>
+              <a:ext cx="2314987" cy="369332"/>
+            </a:xfrm>
+            <a:prstGeom prst="rect">
+              <a:avLst/>
+            </a:prstGeom>
+            <a:noFill/>
+          </p:spPr>
+          <p:txBody>
+            <a:bodyPr wrap="square" rtlCol="0">
+              <a:spAutoFit/>
+            </a:bodyPr>
+            <a:lstStyle/>
+            <a:p>
+              <a:pPr algn="ctr"/>
+              <a:r>
+                <a:rPr lang="en-US" dirty="0">
+                  <a:latin typeface="Times New Roman" panose="02020603050405020304" pitchFamily="18" charset="0"/>
+                  <a:cs typeface="Times New Roman" panose="02020603050405020304" pitchFamily="18" charset="0"/>
+                </a:rPr>
+                <a:t>Classical Optimizer</a:t>
+              </a:r>
+            </a:p>
+          </p:txBody>
+        </p:sp>
+        <p:pic>
+          <p:nvPicPr>
+            <p:cNvPr id="2" name="Picture 1">
+              <a:extLst>
+                <a:ext uri="{FF2B5EF4-FFF2-40B4-BE49-F238E27FC236}">
+                  <a16:creationId xmlns:a16="http://schemas.microsoft.com/office/drawing/2014/main" id="{F560ADBE-6B43-2047-B727-AAE8B77EFE8F}"/>
+                </a:ext>
+              </a:extLst>
+            </p:cNvPr>
+            <p:cNvPicPr>
+              <a:picLocks noChangeAspect="1"/>
+            </p:cNvPicPr>
+            <p:nvPr/>
+          </p:nvPicPr>
+          <p:blipFill>
+            <a:blip r:embed="rId3"/>
+            <a:stretch>
+              <a:fillRect/>
+            </a:stretch>
+          </p:blipFill>
+          <p:spPr>
+            <a:xfrm>
+              <a:off x="8224463" y="2161032"/>
+              <a:ext cx="2118518" cy="255326"/>
+            </a:xfrm>
+            <a:prstGeom prst="rect">
+              <a:avLst/>
+            </a:prstGeom>
+          </p:spPr>
+        </p:pic>
+      </p:grpSp>
+    </p:spTree>
+    <p:extLst>
+      <p:ext uri="{BB962C8B-B14F-4D97-AF65-F5344CB8AC3E}">
+        <p14:creationId xmlns:p14="http://schemas.microsoft.com/office/powerpoint/2010/main" val="1973786987"/>
+      </p:ext>
+    </p:extLst>
+  </p:cSld>
+  <p:clrMapOvr>
+    <a:masterClrMapping/>
+  </p:clrMapOvr>
+</p:sld>
+</file>
+
 <file path=ppt/theme/theme1.xml><?xml version="1.0" encoding="utf-8"?>
 <a:theme xmlns:a="http://schemas.openxmlformats.org/drawingml/2006/main" name="Office Theme">
   <a:themeElements>

</xml_diff>